<commit_message>
mise à jour de mon powerpoint
</commit_message>
<xml_diff>
--- a/Aviaco france.pptx
+++ b/Aviaco france.pptx
@@ -8741,7 +8741,7 @@
         <p:spPr>
           <a:xfrm>
             <a:off x="-10509" y="-14513"/>
-            <a:ext cx="2318280" cy="1483506"/>
+            <a:ext cx="2171786" cy="1483506"/>
           </a:xfrm>
           <a:prstGeom prst="rect">
             <a:avLst/>
@@ -8789,7 +8789,7 @@
         <p:spPr>
           <a:xfrm>
             <a:off x="-12515" y="1483507"/>
-            <a:ext cx="2320286" cy="1187122"/>
+            <a:ext cx="2173792" cy="1187122"/>
           </a:xfrm>
           <a:prstGeom prst="rect">
             <a:avLst/>
@@ -8822,7 +8822,7 @@
             <a:pPr algn="ctr"/>
             <a:r>
               <a:rPr lang="fr-FR" dirty="0" smtClean="0"/>
-              <a:t>AVIACO FRANCE</a:t>
+              <a:t>AICOM</a:t>
             </a:r>
             <a:endParaRPr lang="fr-FR" dirty="0"/>
           </a:p>
@@ -8837,7 +8837,7 @@
         <p:spPr>
           <a:xfrm>
             <a:off x="-14510" y="2688198"/>
-            <a:ext cx="2510967" cy="1041978"/>
+            <a:ext cx="2175787" cy="1041978"/>
           </a:xfrm>
           <a:prstGeom prst="rect">
             <a:avLst/>
@@ -8870,7 +8870,7 @@
             <a:pPr algn="ctr"/>
             <a:r>
               <a:rPr lang="fr-FR" dirty="0" smtClean="0"/>
-              <a:t>SITE INTERNET</a:t>
+              <a:t>PROJETS</a:t>
             </a:r>
             <a:endParaRPr lang="fr-FR" dirty="0"/>
           </a:p>
@@ -8884,8 +8884,8 @@
         </p:nvSpPr>
         <p:spPr>
           <a:xfrm>
-            <a:off x="-18425" y="3749233"/>
-            <a:ext cx="2552981" cy="967920"/>
+            <a:off x="-18424" y="3749233"/>
+            <a:ext cx="2179702" cy="967920"/>
           </a:xfrm>
           <a:prstGeom prst="rect">
             <a:avLst/>
@@ -8986,7 +8986,7 @@
         <p:spPr>
           <a:xfrm>
             <a:off x="-9752" y="4733436"/>
-            <a:ext cx="2544308" cy="1001486"/>
+            <a:ext cx="2171029" cy="1001486"/>
           </a:xfrm>
           <a:prstGeom prst="rect">
             <a:avLst/>
@@ -16714,8 +16714,8 @@
         </p:nvSpPr>
         <p:spPr>
           <a:xfrm>
-            <a:off x="-12515" y="1483507"/>
-            <a:ext cx="2320286" cy="1187122"/>
+            <a:off x="-12515" y="1648705"/>
+            <a:ext cx="2320286" cy="1021924"/>
           </a:xfrm>
           <a:prstGeom prst="rect">
             <a:avLst/>
@@ -16748,7 +16748,7 @@
             <a:pPr algn="ctr"/>
             <a:r>
               <a:rPr lang="fr-FR" dirty="0" smtClean="0"/>
-              <a:t>AVIACO FRANCE</a:t>
+              <a:t>AICOM</a:t>
             </a:r>
             <a:endParaRPr lang="fr-FR" dirty="0"/>
           </a:p>
@@ -17444,7 +17444,7 @@
             <a:pPr algn="ctr"/>
             <a:r>
               <a:rPr lang="fr-FR" dirty="0" smtClean="0"/>
-              <a:t>AVIACO FRANCE</a:t>
+              <a:t>AICOM</a:t>
             </a:r>
             <a:endParaRPr lang="fr-FR" dirty="0"/>
           </a:p>
@@ -18589,14 +18589,14 @@
           <p:nvPr>
             <p:extLst>
               <p:ext uri="{D42A27DB-BD31-4B8C-83A1-F6EECF244321}">
-                <p14:modId xmlns:p14="http://schemas.microsoft.com/office/powerpoint/2010/main" val="422364341"/>
+                <p14:modId xmlns:p14="http://schemas.microsoft.com/office/powerpoint/2010/main" val="2971099837"/>
               </p:ext>
             </p:extLst>
           </p:nvPr>
         </p:nvGraphicFramePr>
         <p:xfrm>
-          <a:off x="3382034" y="2222171"/>
-          <a:ext cx="6618235" cy="4114235"/>
+          <a:off x="3382034" y="2361658"/>
+          <a:ext cx="6618235" cy="3974748"/>
         </p:xfrm>
         <a:graphic>
           <a:graphicData uri="http://schemas.openxmlformats.org/drawingml/2006/chart">
@@ -19826,7 +19826,7 @@
         <p:spPr>
           <a:xfrm>
             <a:off x="-14510" y="2688198"/>
-            <a:ext cx="2510967" cy="1041978"/>
+            <a:ext cx="2164647" cy="1041978"/>
           </a:xfrm>
           <a:prstGeom prst="rect">
             <a:avLst/>
@@ -20185,7 +20185,7 @@
         <p:spPr>
           <a:xfrm>
             <a:off x="-12515" y="1483507"/>
-            <a:ext cx="2162652" cy="1187122"/>
+            <a:ext cx="2218356" cy="1187122"/>
           </a:xfrm>
           <a:prstGeom prst="rect">
             <a:avLst/>
@@ -22406,7 +22406,7 @@
             <a:pPr algn="ctr"/>
             <a:r>
               <a:rPr lang="fr-FR" dirty="0" smtClean="0"/>
-              <a:t>AVIACO FRANCE</a:t>
+              <a:t>AICOM</a:t>
             </a:r>
             <a:endParaRPr lang="fr-FR" dirty="0"/>
           </a:p>
@@ -23074,7 +23074,7 @@
             <a:pPr algn="ctr"/>
             <a:r>
               <a:rPr lang="fr-FR" dirty="0" smtClean="0"/>
-              <a:t>AVIACO FRANCE</a:t>
+              <a:t>AICOM</a:t>
             </a:r>
             <a:endParaRPr lang="fr-FR" dirty="0"/>
           </a:p>
@@ -24045,7 +24045,7 @@
             <a:pPr algn="ctr"/>
             <a:r>
               <a:rPr lang="fr-FR" dirty="0" smtClean="0"/>
-              <a:t>AVIACO FRANCE</a:t>
+              <a:t>AICOM</a:t>
             </a:r>
             <a:endParaRPr lang="fr-FR" dirty="0"/>
           </a:p>

</xml_diff>